<commit_message>
terminamos todos los tp
</commit_message>
<xml_diff>
--- a/trabajos practicos/office-integracion/tp1/Siglo XXI.pptx
+++ b/trabajos practicos/office-integracion/tp1/Siglo XXI.pptx
@@ -5,14 +5,19 @@
     <p:sldMasterId id="2147483823" r:id="rId1"/>
   </p:sldMasterIdLst>
   <p:notesMasterIdLst>
-    <p:notesMasterId r:id="rId4"/>
+    <p:notesMasterId r:id="rId9"/>
   </p:notesMasterIdLst>
   <p:handoutMasterIdLst>
-    <p:handoutMasterId r:id="rId5"/>
+    <p:handoutMasterId r:id="rId10"/>
   </p:handoutMasterIdLst>
   <p:sldIdLst>
     <p:sldId id="256" r:id="rId2"/>
-    <p:sldId id="260" r:id="rId3"/>
+    <p:sldId id="261" r:id="rId3"/>
+    <p:sldId id="262" r:id="rId4"/>
+    <p:sldId id="263" r:id="rId5"/>
+    <p:sldId id="264" r:id="rId6"/>
+    <p:sldId id="260" r:id="rId7"/>
+    <p:sldId id="265" r:id="rId8"/>
   </p:sldIdLst>
   <p:sldSz cx="9144000" cy="6858000" type="screen4x3"/>
   <p:notesSz cx="6858000" cy="9144000"/>
@@ -385,6 +390,11 @@
         </p:txBody>
       </p:sp>
     </p:spTree>
+    <p:extLst>
+      <p:ext uri="{BB962C8B-B14F-4D97-AF65-F5344CB8AC3E}">
+        <p14:creationId xmlns:p14="http://schemas.microsoft.com/office/powerpoint/2010/main" val="1"/>
+      </p:ext>
+    </p:extLst>
   </p:cSld>
   <p:clrMap bg1="lt1" tx1="dk1" bg2="lt2" tx2="dk2" accent1="accent1" accent2="accent2" accent3="accent3" accent4="accent4" accent5="accent5" accent6="accent6" hlink="hlink" folHlink="folHlink"/>
 </p:handoutMaster>
@@ -577,35 +587,35 @@
           <a:p>
             <a:pPr lvl="0"/>
             <a:r>
-              <a:rPr lang="es-ES" noProof="0" smtClean="0"/>
+              <a:rPr lang="es-ES" noProof="0"/>
               <a:t>Haga clic para modificar el estilo de texto del patrón</a:t>
             </a:r>
           </a:p>
           <a:p>
             <a:pPr lvl="1"/>
             <a:r>
-              <a:rPr lang="es-ES" noProof="0" smtClean="0"/>
+              <a:rPr lang="es-ES" noProof="0"/>
               <a:t>Segundo nivel</a:t>
             </a:r>
           </a:p>
           <a:p>
             <a:pPr lvl="2"/>
             <a:r>
-              <a:rPr lang="es-ES" noProof="0" smtClean="0"/>
+              <a:rPr lang="es-ES" noProof="0"/>
               <a:t>Tercer nivel</a:t>
             </a:r>
           </a:p>
           <a:p>
             <a:pPr lvl="3"/>
             <a:r>
-              <a:rPr lang="es-ES" noProof="0" smtClean="0"/>
+              <a:rPr lang="es-ES" noProof="0"/>
               <a:t>Cuarto nivel</a:t>
             </a:r>
           </a:p>
           <a:p>
             <a:pPr lvl="4"/>
             <a:r>
-              <a:rPr lang="es-ES" noProof="0" smtClean="0"/>
+              <a:rPr lang="es-ES" noProof="0"/>
               <a:t>Quinto nivel</a:t>
             </a:r>
           </a:p>
@@ -918,7 +928,7 @@
           <a:lstStyle/>
           <a:p>
             <a:pPr eaLnBrk="1" hangingPunct="1"/>
-            <a:endParaRPr lang="en-US" smtClean="0"/>
+            <a:endParaRPr lang="en-US"/>
           </a:p>
         </p:txBody>
       </p:sp>
@@ -967,7 +977,7 @@
             <a:fld id="{C17843D1-BB47-4131-A0DC-2E24494A85A7}" type="slidenum">
               <a:rPr lang="es-ES"/>
               <a:pPr/>
-              <a:t>2</a:t>
+              <a:t>6</a:t>
             </a:fld>
             <a:endParaRPr lang="es-ES"/>
           </a:p>
@@ -1006,7 +1016,7 @@
           <a:lstStyle/>
           <a:p>
             <a:pPr eaLnBrk="1" hangingPunct="1"/>
-            <a:endParaRPr lang="en-US" smtClean="0"/>
+            <a:endParaRPr lang="en-US"/>
           </a:p>
         </p:txBody>
       </p:sp>
@@ -1092,7 +1102,7 @@
           </a:lstStyle>
           <a:p>
             <a:r>
-              <a:rPr lang="es-ES" smtClean="0"/>
+              <a:rPr lang="es-ES"/>
               <a:t>Haga clic para modificar el estilo de título del patrón</a:t>
             </a:r>
             <a:endParaRPr lang="en-US" dirty="0"/>
@@ -1159,7 +1169,7 @@
           </a:lstStyle>
           <a:p>
             <a:r>
-              <a:rPr lang="es-ES" smtClean="0"/>
+              <a:rPr lang="es-ES"/>
               <a:t>Haga clic para editar el estilo de subtítulo del patrón</a:t>
             </a:r>
             <a:endParaRPr lang="en-US" dirty="0"/>
@@ -1309,7 +1319,7 @@
           </a:lstStyle>
           <a:p>
             <a:r>
-              <a:rPr lang="es-ES" smtClean="0"/>
+              <a:rPr lang="es-ES"/>
               <a:t>Haga clic para modificar el estilo de título del patrón</a:t>
             </a:r>
             <a:endParaRPr lang="en-US" dirty="0"/>
@@ -1374,7 +1384,7 @@
           </a:lstStyle>
           <a:p>
             <a:r>
-              <a:rPr lang="es-ES" smtClean="0"/>
+              <a:rPr lang="es-ES"/>
               <a:t>Haga clic en el icono para agregar una imagen</a:t>
             </a:r>
             <a:endParaRPr lang="en-US" dirty="0"/>
@@ -1440,7 +1450,7 @@
           <a:p>
             <a:pPr lvl="0"/>
             <a:r>
-              <a:rPr lang="es-ES" smtClean="0"/>
+              <a:rPr lang="es-ES"/>
               <a:t>Editar el estilo de texto del patrón</a:t>
             </a:r>
           </a:p>
@@ -1604,7 +1614,7 @@
           </a:lstStyle>
           <a:p>
             <a:r>
-              <a:rPr lang="es-ES" smtClean="0"/>
+              <a:rPr lang="es-ES"/>
               <a:t>Haga clic para modificar el estilo de título del patrón</a:t>
             </a:r>
             <a:endParaRPr lang="en-US" dirty="0"/>
@@ -1670,7 +1680,7 @@
           <a:p>
             <a:pPr lvl="0"/>
             <a:r>
-              <a:rPr lang="es-ES" smtClean="0"/>
+              <a:rPr lang="es-ES"/>
               <a:t>Editar el estilo de texto del patrón</a:t>
             </a:r>
           </a:p>
@@ -1853,7 +1863,7 @@
           </a:lstStyle>
           <a:p>
             <a:r>
-              <a:rPr lang="es-ES" smtClean="0"/>
+              <a:rPr lang="es-ES"/>
               <a:t>Haga clic para modificar el estilo de título del patrón</a:t>
             </a:r>
             <a:endParaRPr lang="en-US" dirty="0"/>
@@ -1921,7 +1931,7 @@
           <a:p>
             <a:pPr lvl="0"/>
             <a:r>
-              <a:rPr lang="es-ES" smtClean="0"/>
+              <a:rPr lang="es-ES"/>
               <a:t>Editar el estilo de texto del patrón</a:t>
             </a:r>
           </a:p>
@@ -1988,7 +1998,7 @@
           <a:p>
             <a:pPr lvl="0"/>
             <a:r>
-              <a:rPr lang="es-ES" smtClean="0"/>
+              <a:rPr lang="es-ES"/>
               <a:t>Editar el estilo de texto del patrón</a:t>
             </a:r>
           </a:p>
@@ -2403,7 +2413,7 @@
           </a:lstStyle>
           <a:p>
             <a:r>
-              <a:rPr lang="es-ES" smtClean="0"/>
+              <a:rPr lang="es-ES"/>
               <a:t>Haga clic para modificar el estilo de título del patrón</a:t>
             </a:r>
             <a:endParaRPr lang="en-US" dirty="0"/>
@@ -2469,7 +2479,7 @@
           <a:p>
             <a:pPr lvl="0"/>
             <a:r>
-              <a:rPr lang="es-ES" smtClean="0"/>
+              <a:rPr lang="es-ES"/>
               <a:t>Editar el estilo de texto del patrón</a:t>
             </a:r>
           </a:p>
@@ -2618,7 +2628,7 @@
           <a:lstStyle/>
           <a:p>
             <a:r>
-              <a:rPr lang="es-ES" smtClean="0"/>
+              <a:rPr lang="es-ES"/>
               <a:t>Haga clic para modificar el estilo de título del patrón</a:t>
             </a:r>
             <a:endParaRPr lang="en-US" dirty="0"/>
@@ -2690,7 +2700,7 @@
           <a:p>
             <a:pPr lvl="0"/>
             <a:r>
-              <a:rPr lang="es-ES" smtClean="0"/>
+              <a:rPr lang="es-ES"/>
               <a:t>Editar el estilo de texto del patrón</a:t>
             </a:r>
           </a:p>
@@ -2757,7 +2767,7 @@
           <a:p>
             <a:pPr lvl="0"/>
             <a:r>
-              <a:rPr lang="es-ES" smtClean="0"/>
+              <a:rPr lang="es-ES"/>
               <a:t>Editar el estilo de texto del patrón</a:t>
             </a:r>
           </a:p>
@@ -2828,7 +2838,7 @@
           <a:p>
             <a:pPr lvl="0"/>
             <a:r>
-              <a:rPr lang="es-ES" smtClean="0"/>
+              <a:rPr lang="es-ES"/>
               <a:t>Editar el estilo de texto del patrón</a:t>
             </a:r>
           </a:p>
@@ -2895,7 +2905,7 @@
           <a:p>
             <a:pPr lvl="0"/>
             <a:r>
-              <a:rPr lang="es-ES" smtClean="0"/>
+              <a:rPr lang="es-ES"/>
               <a:t>Editar el estilo de texto del patrón</a:t>
             </a:r>
           </a:p>
@@ -2966,7 +2976,7 @@
           <a:p>
             <a:pPr lvl="0"/>
             <a:r>
-              <a:rPr lang="es-ES" smtClean="0"/>
+              <a:rPr lang="es-ES"/>
               <a:t>Editar el estilo de texto del patrón</a:t>
             </a:r>
           </a:p>
@@ -3033,7 +3043,7 @@
           <a:p>
             <a:pPr lvl="0"/>
             <a:r>
-              <a:rPr lang="es-ES" smtClean="0"/>
+              <a:rPr lang="es-ES"/>
               <a:t>Editar el estilo de texto del patrón</a:t>
             </a:r>
           </a:p>
@@ -3163,7 +3173,7 @@
           <a:lstStyle/>
           <a:p>
             <a:r>
-              <a:rPr lang="es-ES" smtClean="0"/>
+              <a:rPr lang="es-ES"/>
               <a:t>Haga clic para modificar el estilo de título del patrón</a:t>
             </a:r>
             <a:endParaRPr lang="en-US" dirty="0"/>
@@ -3235,7 +3245,7 @@
           <a:p>
             <a:pPr lvl="0"/>
             <a:r>
-              <a:rPr lang="es-ES" smtClean="0"/>
+              <a:rPr lang="es-ES"/>
               <a:t>Editar el estilo de texto del patrón</a:t>
             </a:r>
           </a:p>
@@ -3313,7 +3323,7 @@
           </a:lstStyle>
           <a:p>
             <a:r>
-              <a:rPr lang="es-ES" smtClean="0"/>
+              <a:rPr lang="es-ES"/>
               <a:t>Haga clic en el icono para agregar una imagen</a:t>
             </a:r>
             <a:endParaRPr lang="en-US" dirty="0"/>
@@ -3381,7 +3391,7 @@
           <a:p>
             <a:pPr lvl="0"/>
             <a:r>
-              <a:rPr lang="es-ES" smtClean="0"/>
+              <a:rPr lang="es-ES"/>
               <a:t>Editar el estilo de texto del patrón</a:t>
             </a:r>
           </a:p>
@@ -3452,7 +3462,7 @@
           <a:p>
             <a:pPr lvl="0"/>
             <a:r>
-              <a:rPr lang="es-ES" smtClean="0"/>
+              <a:rPr lang="es-ES"/>
               <a:t>Editar el estilo de texto del patrón</a:t>
             </a:r>
           </a:p>
@@ -3530,7 +3540,7 @@
           </a:lstStyle>
           <a:p>
             <a:r>
-              <a:rPr lang="es-ES" smtClean="0"/>
+              <a:rPr lang="es-ES"/>
               <a:t>Haga clic en el icono para agregar una imagen</a:t>
             </a:r>
             <a:endParaRPr lang="en-US" dirty="0"/>
@@ -3598,7 +3608,7 @@
           <a:p>
             <a:pPr lvl="0"/>
             <a:r>
-              <a:rPr lang="es-ES" smtClean="0"/>
+              <a:rPr lang="es-ES"/>
               <a:t>Editar el estilo de texto del patrón</a:t>
             </a:r>
           </a:p>
@@ -3669,7 +3679,7 @@
           <a:p>
             <a:pPr lvl="0"/>
             <a:r>
-              <a:rPr lang="es-ES" smtClean="0"/>
+              <a:rPr lang="es-ES"/>
               <a:t>Editar el estilo de texto del patrón</a:t>
             </a:r>
           </a:p>
@@ -3747,7 +3757,7 @@
           </a:lstStyle>
           <a:p>
             <a:r>
-              <a:rPr lang="es-ES" smtClean="0"/>
+              <a:rPr lang="es-ES"/>
               <a:t>Haga clic en el icono para agregar una imagen</a:t>
             </a:r>
             <a:endParaRPr lang="en-US" dirty="0"/>
@@ -3815,7 +3825,7 @@
           <a:p>
             <a:pPr lvl="0"/>
             <a:r>
-              <a:rPr lang="es-ES" smtClean="0"/>
+              <a:rPr lang="es-ES"/>
               <a:t>Editar el estilo de texto del patrón</a:t>
             </a:r>
           </a:p>
@@ -3940,7 +3950,7 @@
           <a:lstStyle/>
           <a:p>
             <a:r>
-              <a:rPr lang="es-ES" smtClean="0"/>
+              <a:rPr lang="es-ES"/>
               <a:t>Haga clic para modificar el estilo de título del patrón</a:t>
             </a:r>
             <a:endParaRPr lang="en-US" dirty="0"/>
@@ -3969,35 +3979,35 @@
           <a:p>
             <a:pPr lvl="0"/>
             <a:r>
-              <a:rPr lang="es-ES" smtClean="0"/>
+              <a:rPr lang="es-ES"/>
               <a:t>Editar el estilo de texto del patrón</a:t>
             </a:r>
           </a:p>
           <a:p>
             <a:pPr lvl="1"/>
             <a:r>
-              <a:rPr lang="es-ES" smtClean="0"/>
+              <a:rPr lang="es-ES"/>
               <a:t>Segundo nivel</a:t>
             </a:r>
           </a:p>
           <a:p>
             <a:pPr lvl="2"/>
             <a:r>
-              <a:rPr lang="es-ES" smtClean="0"/>
+              <a:rPr lang="es-ES"/>
               <a:t>Tercer nivel</a:t>
             </a:r>
           </a:p>
           <a:p>
             <a:pPr lvl="3"/>
             <a:r>
-              <a:rPr lang="es-ES" smtClean="0"/>
+              <a:rPr lang="es-ES"/>
               <a:t>Cuarto nivel</a:t>
             </a:r>
           </a:p>
           <a:p>
             <a:pPr lvl="4"/>
             <a:r>
-              <a:rPr lang="es-ES" smtClean="0"/>
+              <a:rPr lang="es-ES"/>
               <a:t>Quinto nivel</a:t>
             </a:r>
             <a:endParaRPr lang="en-US" dirty="0"/>
@@ -4162,7 +4172,7 @@
           </a:lstStyle>
           <a:p>
             <a:r>
-              <a:rPr lang="es-ES" smtClean="0"/>
+              <a:rPr lang="es-ES"/>
               <a:t>Haga clic para modificar el estilo de título del patrón</a:t>
             </a:r>
             <a:endParaRPr lang="en-US" dirty="0"/>
@@ -4191,35 +4201,35 @@
           <a:p>
             <a:pPr lvl="0"/>
             <a:r>
-              <a:rPr lang="es-ES" smtClean="0"/>
+              <a:rPr lang="es-ES"/>
               <a:t>Editar el estilo de texto del patrón</a:t>
             </a:r>
           </a:p>
           <a:p>
             <a:pPr lvl="1"/>
             <a:r>
-              <a:rPr lang="es-ES" smtClean="0"/>
+              <a:rPr lang="es-ES"/>
               <a:t>Segundo nivel</a:t>
             </a:r>
           </a:p>
           <a:p>
             <a:pPr lvl="2"/>
             <a:r>
-              <a:rPr lang="es-ES" smtClean="0"/>
+              <a:rPr lang="es-ES"/>
               <a:t>Tercer nivel</a:t>
             </a:r>
           </a:p>
           <a:p>
             <a:pPr lvl="3"/>
             <a:r>
-              <a:rPr lang="es-ES" smtClean="0"/>
+              <a:rPr lang="es-ES"/>
               <a:t>Cuarto nivel</a:t>
             </a:r>
           </a:p>
           <a:p>
             <a:pPr lvl="4"/>
             <a:r>
-              <a:rPr lang="es-ES" smtClean="0"/>
+              <a:rPr lang="es-ES"/>
               <a:t>Quinto nivel</a:t>
             </a:r>
             <a:endParaRPr lang="en-US" dirty="0"/>
@@ -4364,7 +4374,7 @@
           <a:lstStyle/>
           <a:p>
             <a:r>
-              <a:rPr lang="es-ES" smtClean="0"/>
+              <a:rPr lang="es-ES"/>
               <a:t>Haga clic para modificar el estilo de título del patrón</a:t>
             </a:r>
             <a:endParaRPr lang="en-US" dirty="0"/>
@@ -4388,35 +4398,35 @@
           <a:p>
             <a:pPr lvl="0"/>
             <a:r>
-              <a:rPr lang="es-ES" smtClean="0"/>
+              <a:rPr lang="es-ES"/>
               <a:t>Editar el estilo de texto del patrón</a:t>
             </a:r>
           </a:p>
           <a:p>
             <a:pPr lvl="1"/>
             <a:r>
-              <a:rPr lang="es-ES" smtClean="0"/>
+              <a:rPr lang="es-ES"/>
               <a:t>Segundo nivel</a:t>
             </a:r>
           </a:p>
           <a:p>
             <a:pPr lvl="2"/>
             <a:r>
-              <a:rPr lang="es-ES" smtClean="0"/>
+              <a:rPr lang="es-ES"/>
               <a:t>Tercer nivel</a:t>
             </a:r>
           </a:p>
           <a:p>
             <a:pPr lvl="3"/>
             <a:r>
-              <a:rPr lang="es-ES" smtClean="0"/>
+              <a:rPr lang="es-ES"/>
               <a:t>Cuarto nivel</a:t>
             </a:r>
           </a:p>
           <a:p>
             <a:pPr lvl="4"/>
             <a:r>
-              <a:rPr lang="es-ES" smtClean="0"/>
+              <a:rPr lang="es-ES"/>
               <a:t>Quinto nivel</a:t>
             </a:r>
             <a:endParaRPr lang="en-US" dirty="0"/>
@@ -4583,7 +4593,7 @@
           </a:lstStyle>
           <a:p>
             <a:r>
-              <a:rPr lang="es-ES" smtClean="0"/>
+              <a:rPr lang="es-ES"/>
               <a:t>Haga clic para modificar el estilo de título del patrón</a:t>
             </a:r>
             <a:endParaRPr lang="en-US" dirty="0"/>
@@ -4705,7 +4715,7 @@
           <a:p>
             <a:pPr lvl="0"/>
             <a:r>
-              <a:rPr lang="es-ES" smtClean="0"/>
+              <a:rPr lang="es-ES"/>
               <a:t>Editar el estilo de texto del patrón</a:t>
             </a:r>
           </a:p>
@@ -4849,7 +4859,7 @@
           <a:lstStyle/>
           <a:p>
             <a:r>
-              <a:rPr lang="es-ES" smtClean="0"/>
+              <a:rPr lang="es-ES"/>
               <a:t>Haga clic para modificar el estilo de título del patrón</a:t>
             </a:r>
             <a:endParaRPr lang="en-US" dirty="0"/>
@@ -4878,35 +4888,35 @@
           <a:p>
             <a:pPr lvl="0"/>
             <a:r>
-              <a:rPr lang="es-ES" smtClean="0"/>
+              <a:rPr lang="es-ES"/>
               <a:t>Editar el estilo de texto del patrón</a:t>
             </a:r>
           </a:p>
           <a:p>
             <a:pPr lvl="1"/>
             <a:r>
-              <a:rPr lang="es-ES" smtClean="0"/>
+              <a:rPr lang="es-ES"/>
               <a:t>Segundo nivel</a:t>
             </a:r>
           </a:p>
           <a:p>
             <a:pPr lvl="2"/>
             <a:r>
-              <a:rPr lang="es-ES" smtClean="0"/>
+              <a:rPr lang="es-ES"/>
               <a:t>Tercer nivel</a:t>
             </a:r>
           </a:p>
           <a:p>
             <a:pPr lvl="3"/>
             <a:r>
-              <a:rPr lang="es-ES" smtClean="0"/>
+              <a:rPr lang="es-ES"/>
               <a:t>Cuarto nivel</a:t>
             </a:r>
           </a:p>
           <a:p>
             <a:pPr lvl="4"/>
             <a:r>
-              <a:rPr lang="es-ES" smtClean="0"/>
+              <a:rPr lang="es-ES"/>
               <a:t>Quinto nivel</a:t>
             </a:r>
             <a:endParaRPr lang="en-US" dirty="0"/>
@@ -4935,35 +4945,35 @@
           <a:p>
             <a:pPr lvl="0"/>
             <a:r>
-              <a:rPr lang="es-ES" smtClean="0"/>
+              <a:rPr lang="es-ES"/>
               <a:t>Editar el estilo de texto del patrón</a:t>
             </a:r>
           </a:p>
           <a:p>
             <a:pPr lvl="1"/>
             <a:r>
-              <a:rPr lang="es-ES" smtClean="0"/>
+              <a:rPr lang="es-ES"/>
               <a:t>Segundo nivel</a:t>
             </a:r>
           </a:p>
           <a:p>
             <a:pPr lvl="2"/>
             <a:r>
-              <a:rPr lang="es-ES" smtClean="0"/>
+              <a:rPr lang="es-ES"/>
               <a:t>Tercer nivel</a:t>
             </a:r>
           </a:p>
           <a:p>
             <a:pPr lvl="3"/>
             <a:r>
-              <a:rPr lang="es-ES" smtClean="0"/>
+              <a:rPr lang="es-ES"/>
               <a:t>Cuarto nivel</a:t>
             </a:r>
           </a:p>
           <a:p>
             <a:pPr lvl="4"/>
             <a:r>
-              <a:rPr lang="es-ES" smtClean="0"/>
+              <a:rPr lang="es-ES"/>
               <a:t>Quinto nivel</a:t>
             </a:r>
             <a:endParaRPr lang="en-US" dirty="0"/>
@@ -5094,7 +5104,7 @@
           <a:lstStyle/>
           <a:p>
             <a:r>
-              <a:rPr lang="es-ES" smtClean="0"/>
+              <a:rPr lang="es-ES"/>
               <a:t>Haga clic para modificar el estilo de título del patrón</a:t>
             </a:r>
             <a:endParaRPr lang="en-US" dirty="0"/>
@@ -5166,7 +5176,7 @@
           <a:p>
             <a:pPr lvl="0"/>
             <a:r>
-              <a:rPr lang="es-ES" smtClean="0"/>
+              <a:rPr lang="es-ES"/>
               <a:t>Editar el estilo de texto del patrón</a:t>
             </a:r>
           </a:p>
@@ -5194,35 +5204,35 @@
           <a:p>
             <a:pPr lvl="0"/>
             <a:r>
-              <a:rPr lang="es-ES" smtClean="0"/>
+              <a:rPr lang="es-ES"/>
               <a:t>Editar el estilo de texto del patrón</a:t>
             </a:r>
           </a:p>
           <a:p>
             <a:pPr lvl="1"/>
             <a:r>
-              <a:rPr lang="es-ES" smtClean="0"/>
+              <a:rPr lang="es-ES"/>
               <a:t>Segundo nivel</a:t>
             </a:r>
           </a:p>
           <a:p>
             <a:pPr lvl="2"/>
             <a:r>
-              <a:rPr lang="es-ES" smtClean="0"/>
+              <a:rPr lang="es-ES"/>
               <a:t>Tercer nivel</a:t>
             </a:r>
           </a:p>
           <a:p>
             <a:pPr lvl="3"/>
             <a:r>
-              <a:rPr lang="es-ES" smtClean="0"/>
+              <a:rPr lang="es-ES"/>
               <a:t>Cuarto nivel</a:t>
             </a:r>
           </a:p>
           <a:p>
             <a:pPr lvl="4"/>
             <a:r>
-              <a:rPr lang="es-ES" smtClean="0"/>
+              <a:rPr lang="es-ES"/>
               <a:t>Quinto nivel</a:t>
             </a:r>
             <a:endParaRPr lang="en-US" dirty="0"/>
@@ -5294,7 +5304,7 @@
           <a:p>
             <a:pPr lvl="0"/>
             <a:r>
-              <a:rPr lang="es-ES" smtClean="0"/>
+              <a:rPr lang="es-ES"/>
               <a:t>Editar el estilo de texto del patrón</a:t>
             </a:r>
           </a:p>
@@ -5322,35 +5332,35 @@
           <a:p>
             <a:pPr lvl="0"/>
             <a:r>
-              <a:rPr lang="es-ES" smtClean="0"/>
+              <a:rPr lang="es-ES"/>
               <a:t>Editar el estilo de texto del patrón</a:t>
             </a:r>
           </a:p>
           <a:p>
             <a:pPr lvl="1"/>
             <a:r>
-              <a:rPr lang="es-ES" smtClean="0"/>
+              <a:rPr lang="es-ES"/>
               <a:t>Segundo nivel</a:t>
             </a:r>
           </a:p>
           <a:p>
             <a:pPr lvl="2"/>
             <a:r>
-              <a:rPr lang="es-ES" smtClean="0"/>
+              <a:rPr lang="es-ES"/>
               <a:t>Tercer nivel</a:t>
             </a:r>
           </a:p>
           <a:p>
             <a:pPr lvl="3"/>
             <a:r>
-              <a:rPr lang="es-ES" smtClean="0"/>
+              <a:rPr lang="es-ES"/>
               <a:t>Cuarto nivel</a:t>
             </a:r>
           </a:p>
           <a:p>
             <a:pPr lvl="4"/>
             <a:r>
-              <a:rPr lang="es-ES" smtClean="0"/>
+              <a:rPr lang="es-ES"/>
               <a:t>Quinto nivel</a:t>
             </a:r>
             <a:endParaRPr lang="en-US" dirty="0"/>
@@ -5476,7 +5486,7 @@
           <a:lstStyle/>
           <a:p>
             <a:r>
-              <a:rPr lang="es-ES" smtClean="0"/>
+              <a:rPr lang="es-ES"/>
               <a:t>Haga clic para modificar el estilo de título del patrón</a:t>
             </a:r>
             <a:endParaRPr lang="en-US" dirty="0"/>
@@ -5714,7 +5724,7 @@
           </a:lstStyle>
           <a:p>
             <a:r>
-              <a:rPr lang="es-ES" smtClean="0"/>
+              <a:rPr lang="es-ES"/>
               <a:t>Haga clic para modificar el estilo de título del patrón</a:t>
             </a:r>
             <a:endParaRPr lang="en-US" dirty="0"/>
@@ -5743,35 +5753,35 @@
           <a:p>
             <a:pPr lvl="0"/>
             <a:r>
-              <a:rPr lang="es-ES" smtClean="0"/>
+              <a:rPr lang="es-ES"/>
               <a:t>Editar el estilo de texto del patrón</a:t>
             </a:r>
           </a:p>
           <a:p>
             <a:pPr lvl="1"/>
             <a:r>
-              <a:rPr lang="es-ES" smtClean="0"/>
+              <a:rPr lang="es-ES"/>
               <a:t>Segundo nivel</a:t>
             </a:r>
           </a:p>
           <a:p>
             <a:pPr lvl="2"/>
             <a:r>
-              <a:rPr lang="es-ES" smtClean="0"/>
+              <a:rPr lang="es-ES"/>
               <a:t>Tercer nivel</a:t>
             </a:r>
           </a:p>
           <a:p>
             <a:pPr lvl="3"/>
             <a:r>
-              <a:rPr lang="es-ES" smtClean="0"/>
+              <a:rPr lang="es-ES"/>
               <a:t>Cuarto nivel</a:t>
             </a:r>
           </a:p>
           <a:p>
             <a:pPr lvl="4"/>
             <a:r>
-              <a:rPr lang="es-ES" smtClean="0"/>
+              <a:rPr lang="es-ES"/>
               <a:t>Quinto nivel</a:t>
             </a:r>
             <a:endParaRPr lang="en-US" dirty="0"/>
@@ -5837,7 +5847,7 @@
           <a:p>
             <a:pPr lvl="0"/>
             <a:r>
-              <a:rPr lang="es-ES" smtClean="0"/>
+              <a:rPr lang="es-ES"/>
               <a:t>Editar el estilo de texto del patrón</a:t>
             </a:r>
           </a:p>
@@ -5971,7 +5981,7 @@
           </a:lstStyle>
           <a:p>
             <a:r>
-              <a:rPr lang="es-ES" smtClean="0"/>
+              <a:rPr lang="es-ES"/>
               <a:t>Haga clic para modificar el estilo de título del patrón</a:t>
             </a:r>
             <a:endParaRPr lang="en-US" dirty="0"/>
@@ -6036,7 +6046,7 @@
           </a:lstStyle>
           <a:p>
             <a:r>
-              <a:rPr lang="es-ES" smtClean="0"/>
+              <a:rPr lang="es-ES"/>
               <a:t>Haga clic en el icono para agregar una imagen</a:t>
             </a:r>
             <a:endParaRPr lang="en-US" dirty="0"/>
@@ -6102,7 +6112,7 @@
           <a:p>
             <a:pPr lvl="0"/>
             <a:r>
-              <a:rPr lang="es-ES" smtClean="0"/>
+              <a:rPr lang="es-ES"/>
               <a:t>Editar el estilo de texto del patrón</a:t>
             </a:r>
           </a:p>
@@ -6272,7 +6282,7 @@
           <a:lstStyle/>
           <a:p>
             <a:r>
-              <a:rPr lang="es-ES" smtClean="0"/>
+              <a:rPr lang="es-ES"/>
               <a:t>Haga clic para modificar el estilo de título del patrón</a:t>
             </a:r>
             <a:endParaRPr lang="en-US" dirty="0"/>
@@ -6306,35 +6316,35 @@
           <a:p>
             <a:pPr lvl="0"/>
             <a:r>
-              <a:rPr lang="es-ES" smtClean="0"/>
+              <a:rPr lang="es-ES"/>
               <a:t>Editar el estilo de texto del patrón</a:t>
             </a:r>
           </a:p>
           <a:p>
             <a:pPr lvl="1"/>
             <a:r>
-              <a:rPr lang="es-ES" smtClean="0"/>
+              <a:rPr lang="es-ES"/>
               <a:t>Segundo nivel</a:t>
             </a:r>
           </a:p>
           <a:p>
             <a:pPr lvl="2"/>
             <a:r>
-              <a:rPr lang="es-ES" smtClean="0"/>
+              <a:rPr lang="es-ES"/>
               <a:t>Tercer nivel</a:t>
             </a:r>
           </a:p>
           <a:p>
             <a:pPr lvl="3"/>
             <a:r>
-              <a:rPr lang="es-ES" smtClean="0"/>
+              <a:rPr lang="es-ES"/>
               <a:t>Cuarto nivel</a:t>
             </a:r>
           </a:p>
           <a:p>
             <a:pPr lvl="4"/>
             <a:r>
-              <a:rPr lang="es-ES" smtClean="0"/>
+              <a:rPr lang="es-ES"/>
               <a:t>Quinto nivel</a:t>
             </a:r>
             <a:endParaRPr lang="en-US" dirty="0"/>
@@ -6877,15 +6887,7 @@
                   <a:srgbClr val="FFC000"/>
                 </a:solidFill>
               </a:rPr>
-              <a:t>en </a:t>
-            </a:r>
-            <a:r>
-              <a:rPr lang="es-ES" b="1" smtClean="0">
-                <a:solidFill>
-                  <a:srgbClr val="FFC000"/>
-                </a:solidFill>
-              </a:rPr>
-              <a:t>productos </a:t>
+              <a:t>en productos </a:t>
             </a:r>
             <a:r>
               <a:rPr lang="es-ES" b="1" dirty="0">
@@ -6999,13 +7001,6 @@
   <p:clrMapOvr>
     <a:masterClrMapping/>
   </p:clrMapOvr>
-  <p:timing>
-    <p:tnLst>
-      <p:par>
-        <p:cTn id="1" dur="indefinite" restart="never" nodeType="tmRoot"/>
-      </p:par>
-    </p:tnLst>
-  </p:timing>
 </p:sld>
 </file>
 
@@ -7026,6 +7021,381 @@
           <a:chExt cx="0" cy="0"/>
         </a:xfrm>
       </p:grpSpPr>
+      <p:graphicFrame>
+        <p:nvGraphicFramePr>
+          <p:cNvPr id="4" name="Objeto 3">
+            <a:extLst>
+              <a:ext uri="{FF2B5EF4-FFF2-40B4-BE49-F238E27FC236}">
+                <a16:creationId xmlns:a16="http://schemas.microsoft.com/office/drawing/2014/main" id="{9C40F599-3A5F-FE76-9423-AA4664D0C522}"/>
+              </a:ext>
+            </a:extLst>
+          </p:cNvPr>
+          <p:cNvGraphicFramePr>
+            <a:graphicFrameLocks noChangeAspect="1"/>
+          </p:cNvGraphicFramePr>
+          <p:nvPr>
+            <p:extLst>
+              <p:ext uri="{D42A27DB-BD31-4B8C-83A1-F6EECF244321}">
+                <p14:modId xmlns:p14="http://schemas.microsoft.com/office/powerpoint/2010/main" val="490293266"/>
+              </p:ext>
+            </p:extLst>
+          </p:nvPr>
+        </p:nvGraphicFramePr>
+        <p:xfrm>
+          <a:off x="2411760" y="404664"/>
+          <a:ext cx="4608512" cy="6354305"/>
+        </p:xfrm>
+        <a:graphic>
+          <a:graphicData uri="http://schemas.openxmlformats.org/presentationml/2006/ole">
+            <mc:AlternateContent xmlns:mc="http://schemas.openxmlformats.org/markup-compatibility/2006">
+              <mc:Choice xmlns:v="urn:schemas-microsoft-com:vml" Requires="v">
+                <p:oleObj name="Document" r:id="rId2" imgW="5587183" imgH="9063276" progId="Word.Document.12">
+                  <p:embed/>
+                </p:oleObj>
+              </mc:Choice>
+              <mc:Fallback>
+                <p:oleObj name="Document" r:id="rId2" imgW="5587183" imgH="9063276" progId="Word.Document.12">
+                  <p:embed/>
+                  <p:pic>
+                    <p:nvPicPr>
+                      <p:cNvPr id="0" name=""/>
+                      <p:cNvPicPr/>
+                      <p:nvPr/>
+                    </p:nvPicPr>
+                    <p:blipFill>
+                      <a:blip r:embed="rId3"/>
+                      <a:stretch>
+                        <a:fillRect/>
+                      </a:stretch>
+                    </p:blipFill>
+                    <p:spPr>
+                      <a:xfrm>
+                        <a:off x="2411760" y="404664"/>
+                        <a:ext cx="4608512" cy="6354305"/>
+                      </a:xfrm>
+                      <a:prstGeom prst="rect">
+                        <a:avLst/>
+                      </a:prstGeom>
+                    </p:spPr>
+                  </p:pic>
+                </p:oleObj>
+              </mc:Fallback>
+            </mc:AlternateContent>
+          </a:graphicData>
+        </a:graphic>
+      </p:graphicFrame>
+    </p:spTree>
+    <p:extLst>
+      <p:ext uri="{BB962C8B-B14F-4D97-AF65-F5344CB8AC3E}">
+        <p14:creationId xmlns:p14="http://schemas.microsoft.com/office/powerpoint/2010/main" val="3315473735"/>
+      </p:ext>
+    </p:extLst>
+  </p:cSld>
+  <p:clrMapOvr>
+    <a:masterClrMapping/>
+  </p:clrMapOvr>
+</p:sld>
+</file>
+
+<file path=ppt/slides/slide3.xml><?xml version="1.0" encoding="utf-8"?>
+<p:sld xmlns:a="http://schemas.openxmlformats.org/drawingml/2006/main" xmlns:r="http://schemas.openxmlformats.org/officeDocument/2006/relationships" xmlns:p="http://schemas.openxmlformats.org/presentationml/2006/main">
+  <p:cSld>
+    <p:spTree>
+      <p:nvGrpSpPr>
+        <p:cNvPr id="1" name=""/>
+        <p:cNvGrpSpPr/>
+        <p:nvPr/>
+      </p:nvGrpSpPr>
+      <p:grpSpPr>
+        <a:xfrm>
+          <a:off x="0" y="0"/>
+          <a:ext cx="0" cy="0"/>
+          <a:chOff x="0" y="0"/>
+          <a:chExt cx="0" cy="0"/>
+        </a:xfrm>
+      </p:grpSpPr>
+      <p:graphicFrame>
+        <p:nvGraphicFramePr>
+          <p:cNvPr id="6" name="Objeto 5">
+            <a:extLst>
+              <a:ext uri="{FF2B5EF4-FFF2-40B4-BE49-F238E27FC236}">
+                <a16:creationId xmlns:a16="http://schemas.microsoft.com/office/drawing/2014/main" id="{822B5AB6-CAF3-53A6-8FDC-FE70FCFB5C65}"/>
+              </a:ext>
+            </a:extLst>
+          </p:cNvPr>
+          <p:cNvGraphicFramePr>
+            <a:graphicFrameLocks noChangeAspect="1"/>
+          </p:cNvGraphicFramePr>
+          <p:nvPr>
+            <p:extLst>
+              <p:ext uri="{D42A27DB-BD31-4B8C-83A1-F6EECF244321}">
+                <p14:modId xmlns:p14="http://schemas.microsoft.com/office/powerpoint/2010/main" val="4065494394"/>
+              </p:ext>
+            </p:extLst>
+          </p:nvPr>
+        </p:nvGraphicFramePr>
+        <p:xfrm>
+          <a:off x="1738313" y="257175"/>
+          <a:ext cx="5956300" cy="6437313"/>
+        </p:xfrm>
+        <a:graphic>
+          <a:graphicData uri="http://schemas.openxmlformats.org/presentationml/2006/ole">
+            <mc:AlternateContent xmlns:mc="http://schemas.openxmlformats.org/markup-compatibility/2006">
+              <mc:Choice xmlns:v="urn:schemas-microsoft-com:vml" Requires="v">
+                <p:oleObj name="Worksheet" r:id="rId2" imgW="9001249" imgH="11277736" progId="Excel.Sheet.12">
+                  <p:link updateAutomatic="1"/>
+                </p:oleObj>
+              </mc:Choice>
+              <mc:Fallback>
+                <p:oleObj name="Worksheet" r:id="rId2" imgW="9001249" imgH="11277736" progId="Excel.Sheet.12">
+                  <p:link updateAutomatic="1"/>
+                  <p:pic>
+                    <p:nvPicPr>
+                      <p:cNvPr id="0" name=""/>
+                      <p:cNvPicPr/>
+                      <p:nvPr/>
+                    </p:nvPicPr>
+                    <p:blipFill>
+                      <a:blip r:embed="rId3"/>
+                      <a:stretch>
+                        <a:fillRect/>
+                      </a:stretch>
+                    </p:blipFill>
+                    <p:spPr>
+                      <a:xfrm>
+                        <a:off x="1738313" y="257175"/>
+                        <a:ext cx="5956300" cy="6437313"/>
+                      </a:xfrm>
+                      <a:prstGeom prst="rect">
+                        <a:avLst/>
+                      </a:prstGeom>
+                      <a:solidFill>
+                        <a:schemeClr val="tx1"/>
+                      </a:solidFill>
+                    </p:spPr>
+                  </p:pic>
+                </p:oleObj>
+              </mc:Fallback>
+            </mc:AlternateContent>
+          </a:graphicData>
+        </a:graphic>
+      </p:graphicFrame>
+    </p:spTree>
+    <p:extLst>
+      <p:ext uri="{BB962C8B-B14F-4D97-AF65-F5344CB8AC3E}">
+        <p14:creationId xmlns:p14="http://schemas.microsoft.com/office/powerpoint/2010/main" val="2955798418"/>
+      </p:ext>
+    </p:extLst>
+  </p:cSld>
+  <p:clrMapOvr>
+    <a:masterClrMapping/>
+  </p:clrMapOvr>
+</p:sld>
+</file>
+
+<file path=ppt/slides/slide4.xml><?xml version="1.0" encoding="utf-8"?>
+<p:sld xmlns:a="http://schemas.openxmlformats.org/drawingml/2006/main" xmlns:r="http://schemas.openxmlformats.org/officeDocument/2006/relationships" xmlns:p="http://schemas.openxmlformats.org/presentationml/2006/main">
+  <p:cSld>
+    <p:spTree>
+      <p:nvGrpSpPr>
+        <p:cNvPr id="1" name=""/>
+        <p:cNvGrpSpPr/>
+        <p:nvPr/>
+      </p:nvGrpSpPr>
+      <p:grpSpPr>
+        <a:xfrm>
+          <a:off x="0" y="0"/>
+          <a:ext cx="0" cy="0"/>
+          <a:chOff x="0" y="0"/>
+          <a:chExt cx="0" cy="0"/>
+        </a:xfrm>
+      </p:grpSpPr>
+      <p:pic>
+        <p:nvPicPr>
+          <p:cNvPr id="4" name="Imagen 3">
+            <a:extLst>
+              <a:ext uri="{FF2B5EF4-FFF2-40B4-BE49-F238E27FC236}">
+                <a16:creationId xmlns:a16="http://schemas.microsoft.com/office/drawing/2014/main" id="{8B6A87BB-D86B-3077-D8D7-F28773F743F4}"/>
+              </a:ext>
+            </a:extLst>
+          </p:cNvPr>
+          <p:cNvPicPr>
+            <a:picLocks noChangeAspect="1"/>
+          </p:cNvPicPr>
+          <p:nvPr/>
+        </p:nvPicPr>
+        <p:blipFill>
+          <a:blip r:embed="rId2"/>
+          <a:stretch>
+            <a:fillRect/>
+          </a:stretch>
+        </p:blipFill>
+        <p:spPr>
+          <a:xfrm>
+            <a:off x="1835696" y="222245"/>
+            <a:ext cx="5760641" cy="6447115"/>
+          </a:xfrm>
+          <a:prstGeom prst="rect">
+            <a:avLst/>
+          </a:prstGeom>
+          <a:solidFill>
+            <a:schemeClr val="tx1"/>
+          </a:solidFill>
+        </p:spPr>
+      </p:pic>
+    </p:spTree>
+    <p:extLst>
+      <p:ext uri="{BB962C8B-B14F-4D97-AF65-F5344CB8AC3E}">
+        <p14:creationId xmlns:p14="http://schemas.microsoft.com/office/powerpoint/2010/main" val="2486517368"/>
+      </p:ext>
+    </p:extLst>
+  </p:cSld>
+  <p:clrMapOvr>
+    <a:masterClrMapping/>
+  </p:clrMapOvr>
+</p:sld>
+</file>
+
+<file path=ppt/slides/slide5.xml><?xml version="1.0" encoding="utf-8"?>
+<p:sld xmlns:a="http://schemas.openxmlformats.org/drawingml/2006/main" xmlns:r="http://schemas.openxmlformats.org/officeDocument/2006/relationships" xmlns:p="http://schemas.openxmlformats.org/presentationml/2006/main">
+  <p:cSld>
+    <p:spTree>
+      <p:nvGrpSpPr>
+        <p:cNvPr id="1" name=""/>
+        <p:cNvGrpSpPr/>
+        <p:nvPr/>
+      </p:nvGrpSpPr>
+      <p:grpSpPr>
+        <a:xfrm>
+          <a:off x="0" y="0"/>
+          <a:ext cx="0" cy="0"/>
+          <a:chOff x="0" y="0"/>
+          <a:chExt cx="0" cy="0"/>
+        </a:xfrm>
+      </p:grpSpPr>
+      <p:pic>
+        <p:nvPicPr>
+          <p:cNvPr id="5" name="Imagen 4">
+            <a:extLst>
+              <a:ext uri="{FF2B5EF4-FFF2-40B4-BE49-F238E27FC236}">
+                <a16:creationId xmlns:a16="http://schemas.microsoft.com/office/drawing/2014/main" id="{9270EDC1-B08B-90C7-FF25-20128B6FCE99}"/>
+              </a:ext>
+            </a:extLst>
+          </p:cNvPr>
+          <p:cNvPicPr>
+            <a:picLocks noChangeAspect="1"/>
+          </p:cNvPicPr>
+          <p:nvPr/>
+        </p:nvPicPr>
+        <p:blipFill>
+          <a:blip r:embed="rId2"/>
+          <a:stretch>
+            <a:fillRect/>
+          </a:stretch>
+        </p:blipFill>
+        <p:spPr>
+          <a:xfrm>
+            <a:off x="131644" y="1700808"/>
+            <a:ext cx="4359494" cy="3559944"/>
+          </a:xfrm>
+          <a:prstGeom prst="rect">
+            <a:avLst/>
+          </a:prstGeom>
+        </p:spPr>
+      </p:pic>
+      <p:graphicFrame>
+        <p:nvGraphicFramePr>
+          <p:cNvPr id="7" name="Objeto 6">
+            <a:extLst>
+              <a:ext uri="{FF2B5EF4-FFF2-40B4-BE49-F238E27FC236}">
+                <a16:creationId xmlns:a16="http://schemas.microsoft.com/office/drawing/2014/main" id="{F6A1F26E-F7DC-612B-106F-3069B271BB97}"/>
+              </a:ext>
+            </a:extLst>
+          </p:cNvPr>
+          <p:cNvGraphicFramePr>
+            <a:graphicFrameLocks noChangeAspect="1"/>
+          </p:cNvGraphicFramePr>
+          <p:nvPr>
+            <p:extLst>
+              <p:ext uri="{D42A27DB-BD31-4B8C-83A1-F6EECF244321}">
+                <p14:modId xmlns:p14="http://schemas.microsoft.com/office/powerpoint/2010/main" val="1946105959"/>
+              </p:ext>
+            </p:extLst>
+          </p:nvPr>
+        </p:nvGraphicFramePr>
+        <p:xfrm>
+          <a:off x="4625975" y="1441450"/>
+          <a:ext cx="4414838" cy="3973513"/>
+        </p:xfrm>
+        <a:graphic>
+          <a:graphicData uri="http://schemas.openxmlformats.org/presentationml/2006/ole">
+            <mc:AlternateContent xmlns:mc="http://schemas.openxmlformats.org/markup-compatibility/2006">
+              <mc:Choice xmlns:v="urn:schemas-microsoft-com:vml" Requires="v">
+                <p:oleObj name="Worksheet" r:id="rId3" imgW="7810538" imgH="7029450" progId="Excel.Sheet.12">
+                  <p:link updateAutomatic="1"/>
+                </p:oleObj>
+              </mc:Choice>
+              <mc:Fallback>
+                <p:oleObj name="Worksheet" r:id="rId3" imgW="7810538" imgH="7029450" progId="Excel.Sheet.12">
+                  <p:link updateAutomatic="1"/>
+                  <p:pic>
+                    <p:nvPicPr>
+                      <p:cNvPr id="0" name=""/>
+                      <p:cNvPicPr/>
+                      <p:nvPr/>
+                    </p:nvPicPr>
+                    <p:blipFill>
+                      <a:blip r:embed="rId4"/>
+                      <a:stretch>
+                        <a:fillRect/>
+                      </a:stretch>
+                    </p:blipFill>
+                    <p:spPr>
+                      <a:xfrm>
+                        <a:off x="4625975" y="1441450"/>
+                        <a:ext cx="4414838" cy="3973513"/>
+                      </a:xfrm>
+                      <a:prstGeom prst="rect">
+                        <a:avLst/>
+                      </a:prstGeom>
+                    </p:spPr>
+                  </p:pic>
+                </p:oleObj>
+              </mc:Fallback>
+            </mc:AlternateContent>
+          </a:graphicData>
+        </a:graphic>
+      </p:graphicFrame>
+    </p:spTree>
+    <p:extLst>
+      <p:ext uri="{BB962C8B-B14F-4D97-AF65-F5344CB8AC3E}">
+        <p14:creationId xmlns:p14="http://schemas.microsoft.com/office/powerpoint/2010/main" val="601106653"/>
+      </p:ext>
+    </p:extLst>
+  </p:cSld>
+  <p:clrMapOvr>
+    <a:masterClrMapping/>
+  </p:clrMapOvr>
+</p:sld>
+</file>
+
+<file path=ppt/slides/slide6.xml><?xml version="1.0" encoding="utf-8"?>
+<p:sld xmlns:a="http://schemas.openxmlformats.org/drawingml/2006/main" xmlns:r="http://schemas.openxmlformats.org/officeDocument/2006/relationships" xmlns:p="http://schemas.openxmlformats.org/presentationml/2006/main">
+  <p:cSld>
+    <p:spTree>
+      <p:nvGrpSpPr>
+        <p:cNvPr id="1" name=""/>
+        <p:cNvGrpSpPr/>
+        <p:nvPr/>
+      </p:nvGrpSpPr>
+      <p:grpSpPr>
+        <a:xfrm>
+          <a:off x="0" y="0"/>
+          <a:ext cx="0" cy="0"/>
+          <a:chOff x="0" y="0"/>
+          <a:chExt cx="0" cy="0"/>
+        </a:xfrm>
+      </p:grpSpPr>
       <p:sp>
         <p:nvSpPr>
           <p:cNvPr id="19462" name="Text Box 6"/>
@@ -7087,40 +7457,6 @@
           </a:p>
         </p:txBody>
       </p:sp>
-      <p:pic>
-        <p:nvPicPr>
-          <p:cNvPr id="10245" name="Picture 9" descr="C:\Documents and Settings\Administrador\Configuración local\Archivos temporales de Internet\Content.IE5\3XGVBSBD\MP900399541[1].jpg">
-            <a:hlinkClick r:id="rId3" action="ppaction://program"/>
-          </p:cNvPr>
-          <p:cNvPicPr>
-            <a:picLocks noChangeAspect="1" noChangeArrowheads="1"/>
-          </p:cNvPicPr>
-          <p:nvPr/>
-        </p:nvPicPr>
-        <p:blipFill>
-          <a:blip r:embed="rId4" cstate="print"/>
-          <a:srcRect/>
-          <a:stretch>
-            <a:fillRect/>
-          </a:stretch>
-        </p:blipFill>
-        <p:spPr bwMode="auto">
-          <a:xfrm>
-            <a:off x="428625" y="642938"/>
-            <a:ext cx="2184400" cy="2928937"/>
-          </a:xfrm>
-          <a:prstGeom prst="rect">
-            <a:avLst/>
-          </a:prstGeom>
-          <a:noFill/>
-          <a:ln w="9525">
-            <a:noFill/>
-            <a:miter lim="800000"/>
-            <a:headEnd/>
-            <a:tailEnd/>
-          </a:ln>
-        </p:spPr>
-      </p:pic>
       <p:cxnSp>
         <p:nvCxnSpPr>
           <p:cNvPr id="11" name="10 Conector recto de flecha"/>
@@ -7166,7 +7502,7 @@
           <p:nvPr/>
         </p:nvPicPr>
         <p:blipFill>
-          <a:blip r:embed="rId5" cstate="print"/>
+          <a:blip r:embed="rId3" cstate="print"/>
           <a:srcRect/>
           <a:stretch>
             <a:fillRect/>
@@ -7198,7 +7534,7 @@
           <p:nvPr/>
         </p:nvPicPr>
         <p:blipFill>
-          <a:blip r:embed="rId6" cstate="print"/>
+          <a:blip r:embed="rId4" cstate="print"/>
           <a:srcRect/>
           <a:stretch>
             <a:fillRect/>
@@ -7224,7 +7560,7 @@
       <p:pic>
         <p:nvPicPr>
           <p:cNvPr id="9" name="8 Imagen" descr="2016-07-28_203056.jpg">
-            <a:hlinkClick r:id="rId7"/>
+            <a:hlinkClick r:id="rId5"/>
           </p:cNvPr>
           <p:cNvPicPr>
             <a:picLocks noChangeAspect="1"/>
@@ -7232,7 +7568,7 @@
           <p:nvPr/>
         </p:nvPicPr>
         <p:blipFill>
-          <a:blip r:embed="rId8"/>
+          <a:blip r:embed="rId6"/>
           <a:stretch>
             <a:fillRect/>
           </a:stretch>
@@ -7256,7 +7592,7 @@
           <p:nvPr/>
         </p:nvPicPr>
         <p:blipFill>
-          <a:blip r:embed="rId9"/>
+          <a:blip r:embed="rId7"/>
           <a:stretch>
             <a:fillRect/>
           </a:stretch>
@@ -7269,6 +7605,40 @@
           <a:prstGeom prst="rect">
             <a:avLst/>
           </a:prstGeom>
+        </p:spPr>
+      </p:pic>
+      <p:pic>
+        <p:nvPicPr>
+          <p:cNvPr id="10245" name="Picture 9" descr="C:\Documents and Settings\Administrador\Configuración local\Archivos temporales de Internet\Content.IE5\3XGVBSBD\MP900399541[1].jpg">
+            <a:hlinkClick r:id="rId8" action="ppaction://program"/>
+          </p:cNvPr>
+          <p:cNvPicPr>
+            <a:picLocks noChangeAspect="1" noChangeArrowheads="1"/>
+          </p:cNvPicPr>
+          <p:nvPr/>
+        </p:nvPicPr>
+        <p:blipFill>
+          <a:blip r:embed="rId9" cstate="print"/>
+          <a:srcRect/>
+          <a:stretch>
+            <a:fillRect/>
+          </a:stretch>
+        </p:blipFill>
+        <p:spPr bwMode="auto">
+          <a:xfrm>
+            <a:off x="428625" y="642938"/>
+            <a:ext cx="2184400" cy="2928937"/>
+          </a:xfrm>
+          <a:prstGeom prst="rect">
+            <a:avLst/>
+          </a:prstGeom>
+          <a:noFill/>
+          <a:ln w="9525">
+            <a:noFill/>
+            <a:miter lim="800000"/>
+            <a:headEnd/>
+            <a:tailEnd/>
+          </a:ln>
         </p:spPr>
       </p:pic>
     </p:spTree>
@@ -7276,13 +7646,144 @@
   <p:clrMapOvr>
     <a:masterClrMapping/>
   </p:clrMapOvr>
-  <p:timing>
-    <p:tnLst>
-      <p:par>
-        <p:cTn id="1" dur="indefinite" restart="never" nodeType="tmRoot"/>
-      </p:par>
-    </p:tnLst>
-  </p:timing>
+</p:sld>
+</file>
+
+<file path=ppt/slides/slide7.xml><?xml version="1.0" encoding="utf-8"?>
+<p:sld xmlns:a="http://schemas.openxmlformats.org/drawingml/2006/main" xmlns:r="http://schemas.openxmlformats.org/officeDocument/2006/relationships" xmlns:p="http://schemas.openxmlformats.org/presentationml/2006/main">
+  <p:cSld>
+    <p:spTree>
+      <p:nvGrpSpPr>
+        <p:cNvPr id="1" name=""/>
+        <p:cNvGrpSpPr/>
+        <p:nvPr/>
+      </p:nvGrpSpPr>
+      <p:grpSpPr>
+        <a:xfrm>
+          <a:off x="0" y="0"/>
+          <a:ext cx="0" cy="0"/>
+          <a:chOff x="0" y="0"/>
+          <a:chExt cx="0" cy="0"/>
+        </a:xfrm>
+      </p:grpSpPr>
+      <p:sp>
+        <p:nvSpPr>
+          <p:cNvPr id="4" name="CuadroTexto 3">
+            <a:extLst>
+              <a:ext uri="{FF2B5EF4-FFF2-40B4-BE49-F238E27FC236}">
+                <a16:creationId xmlns:a16="http://schemas.microsoft.com/office/drawing/2014/main" id="{4B7BFA9C-204D-D9E6-86C2-CBC0629D6C0C}"/>
+              </a:ext>
+            </a:extLst>
+          </p:cNvPr>
+          <p:cNvSpPr txBox="1"/>
+          <p:nvPr/>
+        </p:nvSpPr>
+        <p:spPr>
+          <a:xfrm>
+            <a:off x="179513" y="1196752"/>
+            <a:ext cx="8712968" cy="954107"/>
+          </a:xfrm>
+          <a:prstGeom prst="rect">
+            <a:avLst/>
+          </a:prstGeom>
+          <a:noFill/>
+        </p:spPr>
+        <p:txBody>
+          <a:bodyPr wrap="square" rtlCol="0">
+            <a:spAutoFit/>
+          </a:bodyPr>
+          <a:lstStyle/>
+          <a:p>
+            <a:r>
+              <a:rPr lang="es-AR" sz="1400" dirty="0"/>
+              <a:t>En la diapositiva 3 podemos ver actualizados los datos cuando se modifican en el Excel ya que la tabla la Vinculamos y está asociada a los cambios futuros. En la diapositiva 4 Incrustamos la imagen directamente al PowerPoint con la informacion que teníamos en ese momento y no reflejara ningún cambio futuro.</a:t>
+            </a:r>
+            <a:endParaRPr lang="en-US" sz="1400" dirty="0"/>
+          </a:p>
+        </p:txBody>
+      </p:sp>
+      <p:sp>
+        <p:nvSpPr>
+          <p:cNvPr id="5" name="CuadroTexto 4">
+            <a:extLst>
+              <a:ext uri="{FF2B5EF4-FFF2-40B4-BE49-F238E27FC236}">
+                <a16:creationId xmlns:a16="http://schemas.microsoft.com/office/drawing/2014/main" id="{E79390F8-10DE-9CDB-E1FF-20822253E747}"/>
+              </a:ext>
+            </a:extLst>
+          </p:cNvPr>
+          <p:cNvSpPr txBox="1"/>
+          <p:nvPr/>
+        </p:nvSpPr>
+        <p:spPr>
+          <a:xfrm>
+            <a:off x="215516" y="2474893"/>
+            <a:ext cx="8712968" cy="1384995"/>
+          </a:xfrm>
+          <a:prstGeom prst="rect">
+            <a:avLst/>
+          </a:prstGeom>
+          <a:noFill/>
+        </p:spPr>
+        <p:txBody>
+          <a:bodyPr wrap="square" rtlCol="0">
+            <a:spAutoFit/>
+          </a:bodyPr>
+          <a:lstStyle/>
+          <a:p>
+            <a:r>
+              <a:rPr lang="es-AR" sz="1400" dirty="0"/>
+              <a:t>En la diapositiva 5 no se actualiza el grafico circular porque fue incrustada la imagen, pero en el archivo Excel si se actualiza el grafico circular (hoja - totales) ya que se renderiza con los valores de la hoja originaria (hoja - precios) donde modificamos los valores la lista de precios. En cambio, el grafico de columnas se actualizo tanto en el Excel por el mismo motivo que el grafico circular y ademas se modificó en la diapositiva del PowerPoint ya que este fue vinculado y reacciona a todos las alteraciones que se realicen en la tabla de Excel.</a:t>
+            </a:r>
+            <a:endParaRPr lang="en-US" sz="1400" dirty="0"/>
+          </a:p>
+        </p:txBody>
+      </p:sp>
+      <p:sp>
+        <p:nvSpPr>
+          <p:cNvPr id="2" name="CuadroTexto 1">
+            <a:extLst>
+              <a:ext uri="{FF2B5EF4-FFF2-40B4-BE49-F238E27FC236}">
+                <a16:creationId xmlns:a16="http://schemas.microsoft.com/office/drawing/2014/main" id="{62535890-86B2-6C0F-9B5B-54CC90D31E84}"/>
+              </a:ext>
+            </a:extLst>
+          </p:cNvPr>
+          <p:cNvSpPr txBox="1"/>
+          <p:nvPr/>
+        </p:nvSpPr>
+        <p:spPr>
+          <a:xfrm>
+            <a:off x="215516" y="4186461"/>
+            <a:ext cx="8424936" cy="523220"/>
+          </a:xfrm>
+          <a:prstGeom prst="rect">
+            <a:avLst/>
+          </a:prstGeom>
+          <a:noFill/>
+        </p:spPr>
+        <p:txBody>
+          <a:bodyPr wrap="square" rtlCol="0">
+            <a:spAutoFit/>
+          </a:bodyPr>
+          <a:lstStyle/>
+          <a:p>
+            <a:r>
+              <a:rPr lang="es-AR" sz="1400" dirty="0"/>
+              <a:t>Si por error borramos el grafico de columnas en el Excel, también se borrará en el PowerPoint ya que están vinculados y reaccionara a los cambios que el Excel sufra.</a:t>
+            </a:r>
+            <a:endParaRPr lang="en-US" sz="1400" dirty="0"/>
+          </a:p>
+        </p:txBody>
+      </p:sp>
+    </p:spTree>
+    <p:extLst>
+      <p:ext uri="{BB962C8B-B14F-4D97-AF65-F5344CB8AC3E}">
+        <p14:creationId xmlns:p14="http://schemas.microsoft.com/office/powerpoint/2010/main" val="4012805809"/>
+      </p:ext>
+    </p:extLst>
+  </p:cSld>
+  <p:clrMapOvr>
+    <a:masterClrMapping/>
+  </p:clrMapOvr>
 </p:sld>
 </file>
 

</xml_diff>